<commit_message>
Ecotoxicomic poster first draft
</commit_message>
<xml_diff>
--- a/docs/Poster_Ecotoxicomic_sbasak.pptx
+++ b/docs/Poster_Ecotoxicomic_sbasak.pptx
@@ -197,7 +197,7 @@
           <a:p>
             <a:fld id="{30B2879C-E2E7-41DD-8C48-B2C9A03F15D4}" type="datetimeFigureOut">
               <a:rPr lang="fr-FR" smtClean="0"/>
-              <a:t>26/09/2024</a:t>
+              <a:t>04/10/2024</a:t>
             </a:fld>
             <a:endParaRPr lang="fr-FR"/>
           </a:p>
@@ -596,7 +596,7 @@
           <a:p>
             <a:fld id="{36858CB8-11F8-4AAC-AB86-67A36E1B5295}" type="datetimeFigureOut">
               <a:rPr lang="fr-FR" smtClean="0"/>
-              <a:t>26/09/2024</a:t>
+              <a:t>04/10/2024</a:t>
             </a:fld>
             <a:endParaRPr lang="fr-FR" dirty="0"/>
           </a:p>
@@ -766,7 +766,7 @@
           <a:p>
             <a:fld id="{36858CB8-11F8-4AAC-AB86-67A36E1B5295}" type="datetimeFigureOut">
               <a:rPr lang="fr-FR" smtClean="0"/>
-              <a:t>26/09/2024</a:t>
+              <a:t>04/10/2024</a:t>
             </a:fld>
             <a:endParaRPr lang="fr-FR" dirty="0"/>
           </a:p>
@@ -946,7 +946,7 @@
           <a:p>
             <a:fld id="{36858CB8-11F8-4AAC-AB86-67A36E1B5295}" type="datetimeFigureOut">
               <a:rPr lang="fr-FR" smtClean="0"/>
-              <a:t>26/09/2024</a:t>
+              <a:t>04/10/2024</a:t>
             </a:fld>
             <a:endParaRPr lang="fr-FR" dirty="0"/>
           </a:p>
@@ -1116,7 +1116,7 @@
           <a:p>
             <a:fld id="{36858CB8-11F8-4AAC-AB86-67A36E1B5295}" type="datetimeFigureOut">
               <a:rPr lang="fr-FR" smtClean="0"/>
-              <a:t>26/09/2024</a:t>
+              <a:t>04/10/2024</a:t>
             </a:fld>
             <a:endParaRPr lang="fr-FR" dirty="0"/>
           </a:p>
@@ -1360,7 +1360,7 @@
           <a:p>
             <a:fld id="{36858CB8-11F8-4AAC-AB86-67A36E1B5295}" type="datetimeFigureOut">
               <a:rPr lang="fr-FR" smtClean="0"/>
-              <a:t>26/09/2024</a:t>
+              <a:t>04/10/2024</a:t>
             </a:fld>
             <a:endParaRPr lang="fr-FR" dirty="0"/>
           </a:p>
@@ -1592,7 +1592,7 @@
           <a:p>
             <a:fld id="{36858CB8-11F8-4AAC-AB86-67A36E1B5295}" type="datetimeFigureOut">
               <a:rPr lang="fr-FR" smtClean="0"/>
-              <a:t>26/09/2024</a:t>
+              <a:t>04/10/2024</a:t>
             </a:fld>
             <a:endParaRPr lang="fr-FR" dirty="0"/>
           </a:p>
@@ -1959,7 +1959,7 @@
           <a:p>
             <a:fld id="{36858CB8-11F8-4AAC-AB86-67A36E1B5295}" type="datetimeFigureOut">
               <a:rPr lang="fr-FR" smtClean="0"/>
-              <a:t>26/09/2024</a:t>
+              <a:t>04/10/2024</a:t>
             </a:fld>
             <a:endParaRPr lang="fr-FR" dirty="0"/>
           </a:p>
@@ -2077,7 +2077,7 @@
           <a:p>
             <a:fld id="{36858CB8-11F8-4AAC-AB86-67A36E1B5295}" type="datetimeFigureOut">
               <a:rPr lang="fr-FR" smtClean="0"/>
-              <a:t>26/09/2024</a:t>
+              <a:t>04/10/2024</a:t>
             </a:fld>
             <a:endParaRPr lang="fr-FR" dirty="0"/>
           </a:p>
@@ -2172,7 +2172,7 @@
           <a:p>
             <a:fld id="{36858CB8-11F8-4AAC-AB86-67A36E1B5295}" type="datetimeFigureOut">
               <a:rPr lang="fr-FR" smtClean="0"/>
-              <a:t>26/09/2024</a:t>
+              <a:t>04/10/2024</a:t>
             </a:fld>
             <a:endParaRPr lang="fr-FR" dirty="0"/>
           </a:p>
@@ -2449,7 +2449,7 @@
           <a:p>
             <a:fld id="{36858CB8-11F8-4AAC-AB86-67A36E1B5295}" type="datetimeFigureOut">
               <a:rPr lang="fr-FR" smtClean="0"/>
-              <a:t>26/09/2024</a:t>
+              <a:t>04/10/2024</a:t>
             </a:fld>
             <a:endParaRPr lang="fr-FR" dirty="0"/>
           </a:p>
@@ -2706,7 +2706,7 @@
           <a:p>
             <a:fld id="{36858CB8-11F8-4AAC-AB86-67A36E1B5295}" type="datetimeFigureOut">
               <a:rPr lang="fr-FR" smtClean="0"/>
-              <a:t>26/09/2024</a:t>
+              <a:t>04/10/2024</a:t>
             </a:fld>
             <a:endParaRPr lang="fr-FR" dirty="0"/>
           </a:p>
@@ -2919,7 +2919,7 @@
           <a:p>
             <a:fld id="{36858CB8-11F8-4AAC-AB86-67A36E1B5295}" type="datetimeFigureOut">
               <a:rPr lang="fr-FR" smtClean="0"/>
-              <a:t>26/09/2024</a:t>
+              <a:t>04/10/2024</a:t>
             </a:fld>
             <a:endParaRPr lang="fr-FR" dirty="0"/>
           </a:p>
@@ -3645,11 +3645,7 @@
             </a:r>
             <a:r>
               <a:rPr lang="fr-FR" sz="3600" b="1" dirty="0" smtClean="0"/>
-              <a:t> </a:t>
-            </a:r>
-            <a:r>
-              <a:rPr lang="fr-FR" sz="3600" b="1" dirty="0" smtClean="0"/>
-              <a:t>PATHWAYS</a:t>
+              <a:t> PATHWAYS</a:t>
             </a:r>
             <a:endParaRPr lang="fr-FR" sz="3600" b="1" dirty="0"/>
           </a:p>
@@ -3679,23 +3675,7 @@
           <a:p>
             <a:r>
               <a:rPr lang="fr-FR" sz="6000" b="1" dirty="0" smtClean="0"/>
-              <a:t>RESULTS &amp; </a:t>
-            </a:r>
-            <a:r>
-              <a:rPr lang="fr-FR" sz="6000" b="1" dirty="0" smtClean="0"/>
-              <a:t>PERSPECTIVES (</a:t>
-            </a:r>
-            <a:r>
-              <a:rPr lang="fr-FR" sz="6000" b="1" dirty="0" smtClean="0">
-                <a:solidFill>
-                  <a:srgbClr val="FF0000"/>
-                </a:solidFill>
-              </a:rPr>
-              <a:t>TODO NS</a:t>
-            </a:r>
-            <a:r>
-              <a:rPr lang="fr-FR" sz="6000" b="1" dirty="0" smtClean="0"/>
-              <a:t>)</a:t>
+              <a:t>RESULTS &amp; PERSPECTIVES </a:t>
             </a:r>
             <a:endParaRPr lang="fr-FR" sz="3600" b="1" dirty="0"/>
           </a:p>
@@ -3938,7 +3918,7 @@
         </p:nvSpPr>
         <p:spPr>
           <a:xfrm>
-            <a:off x="19014016" y="20973140"/>
+            <a:off x="19014016" y="20971690"/>
             <a:ext cx="5583821" cy="646331"/>
           </a:xfrm>
           <a:prstGeom prst="rect">
@@ -4017,26 +3997,220 @@
           <a:bodyPr rtlCol="0" anchor="ctr"/>
           <a:lstStyle/>
           <a:p>
-            <a:pPr>
-              <a:lnSpc>
-                <a:spcPct val="200000"/>
-              </a:lnSpc>
+            <a:endParaRPr lang="fr-FR" sz="3600" b="1" dirty="0" smtClean="0">
+              <a:solidFill>
+                <a:schemeClr val="tx1"/>
+              </a:solidFill>
+            </a:endParaRPr>
+          </a:p>
+          <a:p>
+            <a:endParaRPr lang="fr-FR" sz="3600" b="1" dirty="0">
+              <a:solidFill>
+                <a:schemeClr val="tx1"/>
+              </a:solidFill>
+            </a:endParaRPr>
+          </a:p>
+          <a:p>
+            <a:r>
+              <a:rPr lang="fr-FR" sz="3600" b="1" dirty="0" smtClean="0">
+                <a:solidFill>
+                  <a:schemeClr val="tx1"/>
+                </a:solidFill>
+              </a:rPr>
+              <a:t/>
+            </a:r>
+            <a:br>
+              <a:rPr lang="fr-FR" sz="3600" b="1" dirty="0" smtClean="0">
+                <a:solidFill>
+                  <a:schemeClr val="tx1"/>
+                </a:solidFill>
+              </a:rPr>
+            </a:br>
+            <a:r>
+              <a:rPr lang="fr-FR" sz="3600" b="1" dirty="0" smtClean="0">
+                <a:solidFill>
+                  <a:schemeClr val="tx1"/>
+                </a:solidFill>
+              </a:rPr>
+              <a:t>Relative </a:t>
+            </a:r>
+            <a:r>
+              <a:rPr lang="fr-FR" sz="3600" b="1" dirty="0" smtClean="0">
+                <a:solidFill>
+                  <a:schemeClr val="tx1"/>
+                </a:solidFill>
+              </a:rPr>
+              <a:t>impact of </a:t>
+            </a:r>
+            <a:r>
+              <a:rPr lang="fr-FR" sz="3600" b="1" dirty="0" smtClean="0">
+                <a:solidFill>
+                  <a:schemeClr val="tx1"/>
+                </a:solidFill>
+              </a:rPr>
+              <a:t>different </a:t>
+            </a:r>
+            <a:r>
+              <a:rPr lang="fr-FR" sz="3600" b="1" dirty="0" smtClean="0">
+                <a:solidFill>
+                  <a:schemeClr val="tx1"/>
+                </a:solidFill>
+              </a:rPr>
+              <a:t>environmental pathways </a:t>
+            </a:r>
+            <a:endParaRPr lang="fr-FR" sz="3600" b="1" dirty="0">
+              <a:solidFill>
+                <a:schemeClr val="tx1"/>
+              </a:solidFill>
+            </a:endParaRPr>
+          </a:p>
+          <a:p>
+            <a:r>
+              <a:rPr lang="fr-FR" sz="3600" b="1" dirty="0" smtClean="0">
+                <a:solidFill>
+                  <a:schemeClr val="tx1"/>
+                </a:solidFill>
+              </a:rPr>
+              <a:t/>
+            </a:r>
+            <a:br>
+              <a:rPr lang="fr-FR" sz="3600" b="1" dirty="0" smtClean="0">
+                <a:solidFill>
+                  <a:schemeClr val="tx1"/>
+                </a:solidFill>
+              </a:rPr>
+            </a:br>
+            <a:r>
+              <a:rPr lang="fr-FR" sz="3600" b="1" dirty="0" smtClean="0">
+                <a:solidFill>
+                  <a:schemeClr val="tx1"/>
+                </a:solidFill>
+              </a:rPr>
+              <a:t>1000</a:t>
+            </a:r>
+            <a:r>
+              <a:rPr lang="fr-FR" sz="3600" dirty="0" smtClean="0">
+                <a:solidFill>
+                  <a:schemeClr val="tx1"/>
+                </a:solidFill>
+              </a:rPr>
+              <a:t> Monte Carlo simulations estimated the different pathway exposure</a:t>
+            </a:r>
+            <a:endParaRPr lang="fr-FR" sz="3600" dirty="0">
+              <a:solidFill>
+                <a:schemeClr val="tx1"/>
+              </a:solidFill>
+            </a:endParaRPr>
+          </a:p>
+          <a:p>
+            <a:pPr marL="571500" indent="-571500">
+              <a:buFont typeface="Arial" panose="020B0604020202020204" pitchFamily="34" charset="0"/>
+              <a:buChar char="•"/>
             </a:pPr>
             <a:r>
+              <a:rPr lang="fr-FR" sz="3600" dirty="0" smtClean="0">
+                <a:solidFill>
+                  <a:schemeClr val="tx1"/>
+                </a:solidFill>
+              </a:rPr>
+              <a:t>Recreational swimming has </a:t>
+            </a:r>
+            <a:r>
+              <a:rPr lang="fr-FR" sz="3600" dirty="0" smtClean="0">
+                <a:solidFill>
+                  <a:srgbClr val="FF0000"/>
+                </a:solidFill>
+              </a:rPr>
+              <a:t>highest exposure </a:t>
+            </a:r>
+            <a:r>
+              <a:rPr lang="fr-FR" sz="3600" dirty="0" smtClean="0">
+                <a:solidFill>
+                  <a:schemeClr val="tx1"/>
+                </a:solidFill>
+              </a:rPr>
+              <a:t>among all 3 pathways</a:t>
+            </a:r>
+          </a:p>
+          <a:p>
+            <a:pPr marL="571500" indent="-571500">
+              <a:buFont typeface="Arial" panose="020B0604020202020204" pitchFamily="34" charset="0"/>
+              <a:buChar char="•"/>
+            </a:pPr>
+            <a:r>
+              <a:rPr lang="fr-FR" sz="3600" dirty="0" smtClean="0">
+                <a:solidFill>
+                  <a:schemeClr val="tx1"/>
+                </a:solidFill>
+              </a:rPr>
+              <a:t>Tap water &amp; lettuce consumption has much </a:t>
+            </a:r>
+            <a:r>
+              <a:rPr lang="fr-FR" sz="3600" dirty="0" smtClean="0">
+                <a:solidFill>
+                  <a:schemeClr val="accent6">
+                    <a:lumMod val="75000"/>
+                  </a:schemeClr>
+                </a:solidFill>
+              </a:rPr>
+              <a:t>less exposure</a:t>
+            </a:r>
+          </a:p>
+          <a:p>
+            <a:r>
+              <a:rPr lang="fr-FR" sz="3600" dirty="0">
+                <a:solidFill>
+                  <a:schemeClr val="tx1"/>
+                </a:solidFill>
+              </a:rPr>
+              <a:t/>
+            </a:r>
+            <a:br>
+              <a:rPr lang="fr-FR" sz="3600" dirty="0">
+                <a:solidFill>
+                  <a:schemeClr val="tx1"/>
+                </a:solidFill>
+              </a:rPr>
+            </a:br>
+            <a:r>
               <a:rPr lang="fr-FR" sz="3600" b="1" dirty="0" smtClean="0">
                 <a:solidFill>
                   <a:schemeClr val="tx1"/>
                 </a:solidFill>
               </a:rPr>
-              <a:t>Relative impact of diffeent environmental pathways (</a:t>
+              <a:t>NB</a:t>
+            </a:r>
+            <a:r>
+              <a:rPr lang="fr-FR" sz="3600" dirty="0">
+                <a:solidFill>
+                  <a:schemeClr val="tx1"/>
+                </a:solidFill>
+              </a:rPr>
+              <a:t>:</a:t>
+            </a:r>
+            <a:r>
+              <a:rPr lang="fr-FR" sz="3600" dirty="0" smtClean="0">
+                <a:solidFill>
+                  <a:schemeClr val="tx1"/>
+                </a:solidFill>
+              </a:rPr>
+              <a:t> </a:t>
             </a:r>
             <a:r>
               <a:rPr lang="fr-FR" sz="3600" b="1" dirty="0" smtClean="0">
                 <a:solidFill>
-                  <a:srgbClr val="FF0000"/>
-                </a:solidFill>
-              </a:rPr>
-              <a:t>TODO NS</a:t>
+                  <a:schemeClr val="tx1"/>
+                </a:solidFill>
+              </a:rPr>
+              <a:t>Soil – watershed dynamics of ESBL </a:t>
+            </a:r>
+            <a:r>
+              <a:rPr lang="fr-FR" sz="3600" b="1" i="1" dirty="0" smtClean="0">
+                <a:solidFill>
+                  <a:schemeClr val="tx1"/>
+                </a:solidFill>
+              </a:rPr>
+              <a:t>E. coli </a:t>
             </a:r>
             <a:r>
               <a:rPr lang="fr-FR" sz="3600" b="1" dirty="0" smtClean="0">
@@ -4044,7 +4218,104 @@
                   <a:schemeClr val="tx1"/>
                 </a:solidFill>
               </a:rPr>
-              <a:t>)</a:t>
+              <a:t>uses</a:t>
+            </a:r>
+            <a:r>
+              <a:rPr lang="fr-FR" sz="3600" b="1" i="1" dirty="0" smtClean="0">
+                <a:solidFill>
+                  <a:schemeClr val="tx1"/>
+                </a:solidFill>
+              </a:rPr>
+              <a:t> </a:t>
+            </a:r>
+            <a:r>
+              <a:rPr lang="fr-FR" sz="3600" dirty="0" smtClean="0">
+                <a:solidFill>
+                  <a:schemeClr val="accent1">
+                    <a:lumMod val="75000"/>
+                  </a:schemeClr>
+                </a:solidFill>
+              </a:rPr>
+              <a:t>Sowah </a:t>
+            </a:r>
+            <a:r>
+              <a:rPr lang="fr-FR" sz="3600" dirty="0">
+                <a:solidFill>
+                  <a:schemeClr val="accent1">
+                    <a:lumMod val="75000"/>
+                  </a:schemeClr>
+                </a:solidFill>
+              </a:rPr>
+              <a:t>et al. (2020) </a:t>
+            </a:r>
+            <a:r>
+              <a:rPr lang="fr-FR" sz="3600" b="1" i="1" dirty="0" smtClean="0">
+                <a:solidFill>
+                  <a:schemeClr val="tx1"/>
+                </a:solidFill>
+              </a:rPr>
+              <a:t/>
+            </a:r>
+            <a:br>
+              <a:rPr lang="fr-FR" sz="3600" b="1" i="1" dirty="0" smtClean="0">
+                <a:solidFill>
+                  <a:schemeClr val="tx1"/>
+                </a:solidFill>
+              </a:rPr>
+            </a:br>
+            <a:r>
+              <a:rPr lang="fr-FR" sz="3600" dirty="0" smtClean="0">
+                <a:solidFill>
+                  <a:schemeClr val="tx1"/>
+                </a:solidFill>
+              </a:rPr>
+              <a:t>Based on a simplified version of </a:t>
+            </a:r>
+            <a:r>
+              <a:rPr lang="fr-FR" sz="3600" dirty="0">
+                <a:solidFill>
+                  <a:schemeClr val="accent1">
+                    <a:lumMod val="75000"/>
+                  </a:schemeClr>
+                </a:solidFill>
+              </a:rPr>
+              <a:t>Neitsch et al. (</a:t>
+            </a:r>
+            <a:r>
+              <a:rPr lang="fr-FR" sz="3600" dirty="0" smtClean="0">
+                <a:solidFill>
+                  <a:schemeClr val="accent1">
+                    <a:lumMod val="75000"/>
+                  </a:schemeClr>
+                </a:solidFill>
+              </a:rPr>
+              <a:t>2011) </a:t>
+            </a:r>
+            <a:r>
+              <a:rPr lang="fr-FR" sz="3600" dirty="0" smtClean="0">
+                <a:solidFill>
+                  <a:schemeClr val="tx1"/>
+                </a:solidFill>
+              </a:rPr>
+              <a:t>SWAT</a:t>
+            </a:r>
+            <a:r>
+              <a:rPr lang="fr-FR" sz="3600" dirty="0" smtClean="0">
+                <a:solidFill>
+                  <a:schemeClr val="accent1">
+                    <a:lumMod val="75000"/>
+                  </a:schemeClr>
+                </a:solidFill>
+              </a:rPr>
+              <a:t> </a:t>
+            </a:r>
+            <a:r>
+              <a:rPr lang="fr-FR" sz="3600" dirty="0" smtClean="0">
+                <a:solidFill>
+                  <a:schemeClr val="tx1"/>
+                </a:solidFill>
+              </a:rPr>
+              <a:t>model</a:t>
             </a:r>
             <a:endParaRPr lang="fr-FR" sz="3600" b="1" dirty="0">
               <a:solidFill>
@@ -4078,8 +4349,8 @@
         </p:nvSpPr>
         <p:spPr>
           <a:xfrm>
-            <a:off x="15247129" y="36604755"/>
-            <a:ext cx="13844045" cy="3106833"/>
+            <a:off x="15247129" y="36767049"/>
+            <a:ext cx="13844045" cy="3161159"/>
           </a:xfrm>
           <a:prstGeom prst="roundRect">
             <a:avLst>
@@ -4131,7 +4402,7 @@
                   <a:schemeClr val="tx1"/>
                 </a:solidFill>
               </a:rPr>
-              <a:t>QRA </a:t>
+              <a:t>QRA module </a:t>
             </a:r>
             <a:r>
               <a:rPr lang="fr-FR" sz="3600" b="1" dirty="0" smtClean="0">
@@ -4139,31 +4410,7 @@
                   <a:schemeClr val="tx1"/>
                 </a:solidFill>
               </a:rPr>
-              <a:t>module </a:t>
-            </a:r>
-            <a:r>
-              <a:rPr lang="fr-FR" sz="3600" b="1" dirty="0">
-                <a:solidFill>
-                  <a:schemeClr val="tx1"/>
-                </a:solidFill>
-              </a:rPr>
-              <a:t>perspectives (</a:t>
-            </a:r>
-            <a:r>
-              <a:rPr lang="fr-FR" sz="3600" b="1" dirty="0">
-                <a:solidFill>
-                  <a:srgbClr val="FF0000"/>
-                </a:solidFill>
-              </a:rPr>
-              <a:t>TODO NS</a:t>
-            </a:r>
-            <a:r>
-              <a:rPr lang="fr-FR" sz="3600" b="1" dirty="0" smtClean="0">
-                <a:solidFill>
-                  <a:schemeClr val="tx1"/>
-                </a:solidFill>
-              </a:rPr>
-              <a:t>)</a:t>
+              <a:t>perspectives</a:t>
             </a:r>
             <a:endParaRPr lang="fr-FR" sz="3600" b="1" dirty="0">
               <a:solidFill>
@@ -4238,6 +4485,38 @@
               </a:rPr>
               <a:t>Robustness: </a:t>
             </a:r>
+            <a:r>
+              <a:rPr lang="fr-FR" sz="3600" dirty="0" smtClean="0">
+                <a:solidFill>
+                  <a:schemeClr val="tx1"/>
+                </a:solidFill>
+              </a:rPr>
+              <a:t>Application </a:t>
+            </a:r>
+            <a:r>
+              <a:rPr lang="fr-FR" sz="3600" dirty="0">
+                <a:solidFill>
+                  <a:schemeClr val="tx1"/>
+                </a:solidFill>
+              </a:rPr>
+              <a:t>of a </a:t>
+            </a:r>
+            <a:r>
+              <a:rPr lang="fr-FR" sz="3600" b="1" dirty="0">
+                <a:solidFill>
+                  <a:srgbClr val="0070C0"/>
+                </a:solidFill>
+              </a:rPr>
+              <a:t>SWAT</a:t>
+            </a:r>
+            <a:r>
+              <a:rPr lang="fr-FR" sz="3600" dirty="0">
+                <a:solidFill>
+                  <a:schemeClr val="tx1"/>
+                </a:solidFill>
+              </a:rPr>
+              <a:t> model for user defined geography </a:t>
+            </a:r>
             <a:endParaRPr lang="fr-FR" sz="3600" dirty="0" smtClean="0">
               <a:solidFill>
                 <a:schemeClr val="tx1"/>
@@ -4259,7 +4538,31 @@
                   <a:schemeClr val="tx1"/>
                 </a:solidFill>
               </a:rPr>
-              <a:t>: Integration of a SWAT model for user defined geography </a:t>
+              <a:t>: Integration of </a:t>
+            </a:r>
+            <a:r>
+              <a:rPr lang="en-US" sz="3600" dirty="0" smtClean="0">
+                <a:solidFill>
+                  <a:srgbClr val="FF0000"/>
+                </a:solidFill>
+              </a:rPr>
+              <a:t>anaerobic </a:t>
+            </a:r>
+            <a:r>
+              <a:rPr lang="en-US" sz="3600" dirty="0">
+                <a:solidFill>
+                  <a:srgbClr val="FF0000"/>
+                </a:solidFill>
+              </a:rPr>
+              <a:t>digestion </a:t>
+            </a:r>
+            <a:r>
+              <a:rPr lang="fr-FR" sz="3600" dirty="0" smtClean="0">
+                <a:solidFill>
+                  <a:schemeClr val="tx1"/>
+                </a:solidFill>
+              </a:rPr>
+              <a:t>experimental data </a:t>
             </a:r>
             <a:endParaRPr lang="fr-FR" sz="3600" dirty="0" smtClean="0">
               <a:solidFill>
@@ -7092,9 +7395,9 @@
             <p:grpSpPr>
               <a:xfrm>
                 <a:off x="1127136" y="16260634"/>
-                <a:ext cx="10621912" cy="6275334"/>
+                <a:ext cx="10621912" cy="6210924"/>
                 <a:chOff x="1127136" y="16260634"/>
-                <a:chExt cx="10621912" cy="6275334"/>
+                <a:chExt cx="10621912" cy="6210924"/>
               </a:xfrm>
             </p:grpSpPr>
             <p:grpSp>
@@ -7106,9 +7409,9 @@
               <p:grpSpPr>
                 <a:xfrm>
                   <a:off x="1127136" y="16260634"/>
-                  <a:ext cx="10621912" cy="6275334"/>
+                  <a:ext cx="10621912" cy="6210924"/>
                   <a:chOff x="1086322" y="16360885"/>
-                  <a:chExt cx="10621912" cy="6275334"/>
+                  <a:chExt cx="10621912" cy="6210924"/>
                 </a:xfrm>
               </p:grpSpPr>
               <p:grpSp>
@@ -7120,9 +7423,9 @@
                 <p:grpSpPr>
                   <a:xfrm>
                     <a:off x="1086322" y="16360885"/>
-                    <a:ext cx="10621912" cy="6275334"/>
+                    <a:ext cx="10621912" cy="6210924"/>
                     <a:chOff x="1081364" y="17531909"/>
-                    <a:chExt cx="10621912" cy="6275334"/>
+                    <a:chExt cx="10621912" cy="6210924"/>
                   </a:xfrm>
                 </p:grpSpPr>
                 <p:sp>
@@ -7297,7 +7600,7 @@
                   </p:nvSpPr>
                   <p:spPr>
                     <a:xfrm>
-                      <a:off x="3262198" y="23160912"/>
+                      <a:off x="3285866" y="23096502"/>
                       <a:ext cx="6212908" cy="646331"/>
                     </a:xfrm>
                     <a:prstGeom prst="rect">
@@ -7434,7 +7737,7 @@
             <p:spPr>
               <a:xfrm>
                 <a:off x="1079800" y="22761177"/>
-                <a:ext cx="12268556" cy="4042306"/>
+                <a:ext cx="12268558" cy="4042306"/>
               </a:xfrm>
               <a:prstGeom prst="roundRect">
                 <a:avLst>
@@ -7527,39 +7830,7 @@
                       <a:schemeClr val="tx1"/>
                     </a:solidFill>
                   </a:rPr>
-                  <a:t>      </a:t>
-                </a:r>
-                <a:r>
-                  <a:rPr lang="fr-FR" sz="3600" dirty="0" smtClean="0">
-                    <a:solidFill>
-                      <a:schemeClr val="tx1"/>
-                    </a:solidFill>
-                  </a:rPr>
-                  <a:t>Poultry </a:t>
-                </a:r>
-                <a:r>
-                  <a:rPr lang="fr-FR" sz="3600" dirty="0" smtClean="0">
-                    <a:solidFill>
-                      <a:schemeClr val="tx1"/>
-                    </a:solidFill>
-                  </a:rPr>
-                  <a:t>manure </a:t>
-                </a:r>
-                <a:r>
-                  <a:rPr lang="fr-FR" sz="3600" dirty="0" smtClean="0">
-                    <a:solidFill>
-                      <a:schemeClr val="tx1"/>
-                    </a:solidFill>
-                  </a:rPr>
-                  <a:t>           is </a:t>
-                </a:r>
-                <a:r>
-                  <a:rPr lang="fr-FR" sz="3600" dirty="0" smtClean="0">
-                    <a:solidFill>
-                      <a:schemeClr val="tx1"/>
-                    </a:solidFill>
-                  </a:rPr>
-                  <a:t>used in agricultural lands</a:t>
+                  <a:t>      Poultry manure            is used in agricultural lands</a:t>
                 </a:r>
                 <a:endParaRPr lang="fr-FR" sz="3600" dirty="0">
                   <a:solidFill>
@@ -7576,7 +7847,15 @@
                       <a:schemeClr val="tx1"/>
                     </a:solidFill>
                   </a:rPr>
-                  <a:t>      </a:t>
+                  <a:t>      Ranifall carries ESBL </a:t>
+                </a:r>
+                <a:r>
+                  <a:rPr lang="fr-FR" sz="3600" i="1" dirty="0" smtClean="0">
+                    <a:solidFill>
+                      <a:schemeClr val="tx1"/>
+                    </a:solidFill>
+                  </a:rPr>
+                  <a:t>E. coli        </a:t>
                 </a:r>
                 <a:r>
                   <a:rPr lang="fr-FR" sz="3600" dirty="0" smtClean="0">
@@ -7584,47 +7863,7 @@
                       <a:schemeClr val="tx1"/>
                     </a:solidFill>
                   </a:rPr>
-                  <a:t>Ranifall </a:t>
-                </a:r>
-                <a:r>
-                  <a:rPr lang="fr-FR" sz="3600" dirty="0" smtClean="0">
-                    <a:solidFill>
-                      <a:schemeClr val="tx1"/>
-                    </a:solidFill>
-                  </a:rPr>
-                  <a:t>carries ESBL </a:t>
-                </a:r>
-                <a:r>
-                  <a:rPr lang="fr-FR" sz="3600" i="1" dirty="0" smtClean="0">
-                    <a:solidFill>
-                      <a:schemeClr val="tx1"/>
-                    </a:solidFill>
-                  </a:rPr>
-                  <a:t>E. coli </a:t>
-                </a:r>
-                <a:r>
-                  <a:rPr lang="fr-FR" sz="3600" i="1" dirty="0" smtClean="0">
-                    <a:solidFill>
-                      <a:schemeClr val="tx1"/>
-                    </a:solidFill>
-                  </a:rPr>
-                  <a:t>       </a:t>
-                </a:r>
-                <a:r>
-                  <a:rPr lang="fr-FR" sz="3600" dirty="0" smtClean="0">
-                    <a:solidFill>
-                      <a:schemeClr val="tx1"/>
-                    </a:solidFill>
-                  </a:rPr>
-                  <a:t>to </a:t>
-                </a:r>
-                <a:r>
-                  <a:rPr lang="fr-FR" sz="3600" dirty="0" smtClean="0">
-                    <a:solidFill>
-                      <a:schemeClr val="tx1"/>
-                    </a:solidFill>
-                  </a:rPr>
-                  <a:t>nearby watershed</a:t>
+                  <a:t>to nearby watershed</a:t>
                 </a:r>
               </a:p>
               <a:p>
@@ -7644,17 +7883,7 @@
                       </a:schemeClr>
                     </a:solidFill>
                   </a:rPr>
-                  <a:t>Sowah et al. (2020</a:t>
-                </a:r>
-                <a:r>
-                  <a:rPr lang="fr-FR" sz="3600" dirty="0" smtClean="0">
-                    <a:solidFill>
-                      <a:schemeClr val="accent1">
-                        <a:lumMod val="75000"/>
-                      </a:schemeClr>
-                    </a:solidFill>
-                  </a:rPr>
-                  <a:t>) </a:t>
+                  <a:t>Sowah et al. (2020) </a:t>
                 </a:r>
                 <a:r>
                   <a:rPr lang="fr-FR" sz="3600" dirty="0" smtClean="0">
@@ -7664,11 +7893,6 @@
                   </a:rPr>
                   <a:t>from manure</a:t>
                 </a:r>
-                <a:endParaRPr lang="fr-FR" sz="3600" dirty="0" smtClean="0">
-                  <a:solidFill>
-                    <a:schemeClr val="tx1"/>
-                  </a:solidFill>
-                </a:endParaRPr>
               </a:p>
               <a:p>
                 <a:r>
@@ -7685,23 +7909,7 @@
                       <a:schemeClr val="tx1"/>
                     </a:solidFill>
                   </a:rPr>
-                  <a:t>: soil to </a:t>
-                </a:r>
-                <a:r>
-                  <a:rPr lang="fr-FR" sz="3600" dirty="0" smtClean="0">
-                    <a:solidFill>
-                      <a:schemeClr val="tx1"/>
-                    </a:solidFill>
-                  </a:rPr>
-                  <a:t>fresh harvest               </a:t>
-                </a:r>
-                <a:r>
-                  <a:rPr lang="fr-FR" sz="3600" dirty="0" smtClean="0">
-                    <a:solidFill>
-                      <a:schemeClr val="tx1"/>
-                    </a:solidFill>
-                  </a:rPr>
-                  <a:t>contamination </a:t>
+                  <a:t>: soil to fresh harvest               contamination </a:t>
                 </a:r>
               </a:p>
               <a:p>
@@ -7736,8 +7944,8 @@
             </p:nvSpPr>
             <p:spPr>
               <a:xfrm>
-                <a:off x="13689060" y="26421847"/>
-                <a:ext cx="6817276" cy="3973930"/>
+                <a:off x="13689060" y="26499779"/>
+                <a:ext cx="6817276" cy="3895997"/>
               </a:xfrm>
               <a:prstGeom prst="roundRect">
                 <a:avLst>
@@ -7838,11 +8046,6 @@
                   </a:rPr>
                   <a:t>Drinkng water treatement </a:t>
                 </a:r>
-                <a:endParaRPr lang="fr-FR" sz="3600" dirty="0" smtClean="0">
-                  <a:solidFill>
-                    <a:schemeClr val="tx1"/>
-                  </a:solidFill>
-                </a:endParaRPr>
               </a:p>
               <a:p>
                 <a:pPr marL="742950" indent="-742950">
@@ -7857,11 +8060,6 @@
                   </a:rPr>
                   <a:t>Swimming in bathing sites</a:t>
                 </a:r>
-                <a:endParaRPr lang="fr-FR" sz="3600" dirty="0" smtClean="0">
-                  <a:solidFill>
-                    <a:schemeClr val="tx1"/>
-                  </a:solidFill>
-                </a:endParaRPr>
               </a:p>
               <a:p>
                 <a:pPr marL="742950" indent="-742950">
@@ -7895,8 +8093,8 @@
             </p:nvSpPr>
             <p:spPr>
               <a:xfrm>
-                <a:off x="20847039" y="26426946"/>
-                <a:ext cx="8242570" cy="3968831"/>
+                <a:off x="20847039" y="26499781"/>
+                <a:ext cx="8242570" cy="3895996"/>
               </a:xfrm>
               <a:prstGeom prst="roundRect">
                 <a:avLst>
@@ -7948,15 +8146,7 @@
                       <a:schemeClr val="tx1"/>
                     </a:solidFill>
                   </a:rPr>
-                  <a:t>H</a:t>
-                </a:r>
-                <a:r>
-                  <a:rPr lang="fr-FR" sz="3600" b="1" dirty="0">
-                    <a:solidFill>
-                      <a:schemeClr val="tx1"/>
-                    </a:solidFill>
-                  </a:rPr>
-                  <a:t>uman exposure to ESBL </a:t>
+                  <a:t>Human exposure to ESBL </a:t>
                 </a:r>
                 <a:r>
                   <a:rPr lang="fr-FR" sz="3600" b="1" i="1" dirty="0">
@@ -7982,11 +8172,6 @@
                   </a:rPr>
                   <a:t>:</a:t>
                 </a:r>
-                <a:endParaRPr lang="fr-FR" sz="3600" b="1" dirty="0" smtClean="0">
-                  <a:solidFill>
-                    <a:schemeClr val="tx1"/>
-                  </a:solidFill>
-                </a:endParaRPr>
               </a:p>
               <a:p>
                 <a:pPr marL="571500" indent="-571500">
@@ -8145,15 +8330,7 @@
                       <a:srgbClr val="FF0000"/>
                     </a:solidFill>
                   </a:rPr>
-                  <a:t>Dose-re</a:t>
-                </a:r>
-                <a:r>
-                  <a:rPr lang="fr-FR" sz="3600" dirty="0" smtClean="0">
-                    <a:solidFill>
-                      <a:srgbClr val="FF0000"/>
-                    </a:solidFill>
-                  </a:rPr>
-                  <a:t>sponse</a:t>
+                  <a:t>Dose-response</a:t>
                 </a:r>
                 <a:r>
                   <a:rPr lang="fr-FR" sz="3600" dirty="0" smtClean="0">
@@ -8763,11 +8940,7 @@
             <a:pPr algn="ctr"/>
             <a:r>
               <a:rPr lang="fr-FR" sz="3600" b="1" dirty="0" smtClean="0"/>
-              <a:t>Fresh h</a:t>
-            </a:r>
-            <a:r>
-              <a:rPr lang="fr-FR" sz="3600" b="1" dirty="0" smtClean="0"/>
-              <a:t>arvest</a:t>
+              <a:t>Fresh harvest</a:t>
             </a:r>
             <a:endParaRPr lang="fr-FR" sz="3600" dirty="0"/>
           </a:p>
@@ -9268,8 +9441,8 @@
         </p:nvSpPr>
         <p:spPr>
           <a:xfrm>
-            <a:off x="1102294" y="26280671"/>
-            <a:ext cx="12247627" cy="3252687"/>
+            <a:off x="1102294" y="26328685"/>
+            <a:ext cx="12247628" cy="3204673"/>
           </a:xfrm>
           <a:prstGeom prst="roundRect">
             <a:avLst>
@@ -9306,20 +9479,46 @@
           <a:lstStyle/>
           <a:p>
             <a:r>
+              <a:rPr lang="fr-FR" sz="3600" b="1" dirty="0">
+                <a:solidFill>
+                  <a:schemeClr val="tx1"/>
+                </a:solidFill>
+              </a:rPr>
+              <a:t>DYNAMICS of ESBL </a:t>
+            </a:r>
+            <a:r>
+              <a:rPr lang="fr-FR" sz="3600" b="1" i="1" dirty="0">
+                <a:solidFill>
+                  <a:schemeClr val="tx1"/>
+                </a:solidFill>
+              </a:rPr>
+              <a:t>E. coli</a:t>
+            </a:r>
+            <a:r>
+              <a:rPr lang="fr-FR" sz="3600" b="1" dirty="0">
+                <a:solidFill>
+                  <a:schemeClr val="tx1"/>
+                </a:solidFill>
+              </a:rPr>
+              <a:t> </a:t>
+            </a:r>
+            <a:r>
               <a:rPr lang="fr-FR" sz="3600" b="1" dirty="0" smtClean="0">
                 <a:solidFill>
                   <a:schemeClr val="tx1"/>
                 </a:solidFill>
               </a:rPr>
-              <a:t>Treatement of poultry manure (</a:t>
+              <a:t>in </a:t>
             </a:r>
             <a:r>
               <a:rPr lang="fr-FR" sz="3600" b="1" dirty="0" smtClean="0">
                 <a:solidFill>
-                  <a:srgbClr val="FF0000"/>
-                </a:solidFill>
-              </a:rPr>
-              <a:t>TODO NS</a:t>
+                  <a:schemeClr val="accent2">
+                    <a:lumMod val="75000"/>
+                  </a:schemeClr>
+                </a:solidFill>
+              </a:rPr>
+              <a:t>manure</a:t>
             </a:r>
             <a:r>
               <a:rPr lang="fr-FR" sz="3600" b="1" dirty="0" smtClean="0">
@@ -9327,7 +9526,43 @@
                   <a:schemeClr val="tx1"/>
                 </a:solidFill>
               </a:rPr>
-              <a:t>)</a:t>
+              <a:t>       </a:t>
+            </a:r>
+            <a:r>
+              <a:rPr lang="fr-FR" sz="3600" b="1" dirty="0" smtClean="0">
+                <a:solidFill>
+                  <a:schemeClr val="accent4">
+                    <a:lumMod val="75000"/>
+                  </a:schemeClr>
+                </a:solidFill>
+              </a:rPr>
+              <a:t>soil</a:t>
+            </a:r>
+            <a:r>
+              <a:rPr lang="fr-FR" sz="3600" b="1" dirty="0" smtClean="0">
+                <a:solidFill>
+                  <a:schemeClr val="tx1"/>
+                </a:solidFill>
+              </a:rPr>
+              <a:t>       </a:t>
+            </a:r>
+            <a:r>
+              <a:rPr lang="fr-FR" sz="3600" b="1" dirty="0" smtClean="0">
+                <a:solidFill>
+                  <a:schemeClr val="accent1">
+                    <a:lumMod val="75000"/>
+                  </a:schemeClr>
+                </a:solidFill>
+              </a:rPr>
+              <a:t>watershed</a:t>
+            </a:r>
+            <a:r>
+              <a:rPr lang="fr-FR" sz="3600" b="1" dirty="0" smtClean="0">
+                <a:solidFill>
+                  <a:schemeClr val="tx1"/>
+                </a:solidFill>
+              </a:rPr>
+              <a:t/>
             </a:r>
             <a:br>
               <a:rPr lang="fr-FR" sz="3600" b="1" dirty="0" smtClean="0">
@@ -9344,58 +9579,129 @@
           </a:p>
           <a:p>
             <a:r>
+              <a:rPr lang="fr-FR" sz="3600" dirty="0" smtClean="0">
+                <a:solidFill>
+                  <a:schemeClr val="tx1"/>
+                </a:solidFill>
+              </a:rPr>
+              <a:t>Decay in soil </a:t>
+            </a:r>
+            <a:r>
+              <a:rPr lang="fr-FR" sz="3600" dirty="0" smtClean="0">
+                <a:solidFill>
+                  <a:schemeClr val="accent1">
+                    <a:lumMod val="75000"/>
+                  </a:schemeClr>
+                </a:solidFill>
+              </a:rPr>
+              <a:t>Merchant et al. (2012)</a:t>
+            </a:r>
+            <a:r>
+              <a:rPr lang="fr-FR" sz="3600" dirty="0" smtClean="0">
+                <a:solidFill>
+                  <a:schemeClr val="tx1"/>
+                </a:solidFill>
+              </a:rPr>
+              <a:t>, </a:t>
+            </a:r>
+            <a:r>
+              <a:rPr lang="fr-FR" sz="3600" dirty="0" smtClean="0">
+                <a:solidFill>
+                  <a:schemeClr val="accent1">
+                    <a:lumMod val="75000"/>
+                  </a:schemeClr>
+                </a:solidFill>
+              </a:rPr>
+              <a:t>Phang et al. (2020)</a:t>
+            </a:r>
+            <a:r>
+              <a:rPr lang="fr-FR" sz="3600" dirty="0" smtClean="0">
+                <a:solidFill>
+                  <a:schemeClr val="tx1"/>
+                </a:solidFill>
+              </a:rPr>
+              <a:t>, …</a:t>
+            </a:r>
+          </a:p>
+          <a:p>
+            <a:r>
+              <a:rPr lang="fr-FR" sz="3600" dirty="0">
+                <a:solidFill>
+                  <a:schemeClr val="tx1"/>
+                </a:solidFill>
+              </a:rPr>
+              <a:t>Bacteria transport from soil to watershed </a:t>
+            </a:r>
+            <a:r>
+              <a:rPr lang="fr-FR" sz="3600" dirty="0">
+                <a:solidFill>
+                  <a:schemeClr val="accent1">
+                    <a:lumMod val="75000"/>
+                  </a:schemeClr>
+                </a:solidFill>
+              </a:rPr>
+              <a:t>Neitsch et al</a:t>
+            </a:r>
+            <a:r>
+              <a:rPr lang="fr-FR" sz="3600" dirty="0" smtClean="0">
+                <a:solidFill>
+                  <a:schemeClr val="accent1">
+                    <a:lumMod val="75000"/>
+                  </a:schemeClr>
+                </a:solidFill>
+              </a:rPr>
+              <a:t>. (2011)</a:t>
+            </a:r>
+            <a:endParaRPr lang="fr-FR" sz="3600" dirty="0" smtClean="0">
+              <a:solidFill>
+                <a:schemeClr val="accent1">
+                  <a:lumMod val="75000"/>
+                </a:schemeClr>
+              </a:solidFill>
+            </a:endParaRPr>
+          </a:p>
+          <a:p>
+            <a:r>
               <a:rPr lang="fr-FR" sz="3600" b="1" dirty="0" smtClean="0">
                 <a:solidFill>
+                  <a:srgbClr val="FF0000"/>
+                </a:solidFill>
+              </a:rPr>
+              <a:t>	  Work </a:t>
+            </a:r>
+            <a:r>
+              <a:rPr lang="fr-FR" sz="3600" b="1" dirty="0">
+                <a:solidFill>
+                  <a:srgbClr val="FF0000"/>
+                </a:solidFill>
+              </a:rPr>
+              <a:t>in </a:t>
+            </a:r>
+            <a:r>
+              <a:rPr lang="fr-FR" sz="3600" b="1" dirty="0" smtClean="0">
+                <a:solidFill>
+                  <a:srgbClr val="FF0000"/>
+                </a:solidFill>
+              </a:rPr>
+              <a:t>Progress: </a:t>
+            </a:r>
+            <a:r>
+              <a:rPr lang="en-US" sz="3600" dirty="0">
+                <a:solidFill>
                   <a:schemeClr val="tx1"/>
                 </a:solidFill>
               </a:rPr>
-              <a:t>Composting: </a:t>
-            </a:r>
-          </a:p>
-          <a:p>
-            <a:r>
-              <a:rPr lang="fr-FR" sz="3600" b="1" dirty="0" smtClean="0">
+              <a:t>Anaerobic </a:t>
+            </a:r>
+            <a:r>
+              <a:rPr lang="en-US" sz="3600" dirty="0" smtClean="0">
                 <a:solidFill>
                   <a:schemeClr val="tx1"/>
                 </a:solidFill>
               </a:rPr>
-              <a:t>Decay: </a:t>
-            </a:r>
-            <a:r>
-              <a:rPr lang="fr-FR" sz="3600" dirty="0" smtClean="0">
-                <a:solidFill>
-                  <a:schemeClr val="tx1"/>
-                </a:solidFill>
-              </a:rPr>
-              <a:t>Environmental decay </a:t>
-            </a:r>
-          </a:p>
-          <a:p>
-            <a:r>
-              <a:rPr lang="fr-FR" sz="3600" b="1" dirty="0">
-                <a:solidFill>
-                  <a:srgbClr val="FF0000"/>
-                </a:solidFill>
-              </a:rPr>
-              <a:t>Work in </a:t>
-            </a:r>
-            <a:r>
-              <a:rPr lang="fr-FR" sz="3600" b="1" dirty="0" smtClean="0">
-                <a:solidFill>
-                  <a:srgbClr val="FF0000"/>
-                </a:solidFill>
-              </a:rPr>
-              <a:t>Progress: </a:t>
-            </a:r>
-            <a:r>
-              <a:rPr lang="fr-FR" sz="3600" dirty="0" smtClean="0">
-                <a:solidFill>
-                  <a:schemeClr val="tx1"/>
-                </a:solidFill>
-              </a:rPr>
-              <a:t>poultry manure intervention strategies</a:t>
-            </a:r>
-            <a:endParaRPr lang="fr-FR" sz="3600" dirty="0">
+              <a:t>digestion of poultry manure</a:t>
+            </a:r>
+            <a:endParaRPr lang="fr-FR" sz="3600" dirty="0" smtClean="0">
               <a:solidFill>
                 <a:schemeClr val="tx1"/>
               </a:solidFill>
@@ -9412,7 +9718,7 @@
           <p:nvPr/>
         </p:nvPicPr>
         <p:blipFill>
-          <a:blip r:embed="rId10" cstate="print">
+          <a:blip r:embed="rId35" cstate="print">
             <a:extLst>
               <a:ext uri="{28A0092B-C50C-407E-A947-70E740481C1C}">
                 <a14:useLocalDpi xmlns:a14="http://schemas.microsoft.com/office/drawing/2010/main" val="0"/>
@@ -9442,7 +9748,7 @@
           <p:nvPr/>
         </p:nvPicPr>
         <p:blipFill>
-          <a:blip r:embed="rId35" cstate="print">
+          <a:blip r:embed="rId36" cstate="print">
             <a:extLst>
               <a:ext uri="{28A0092B-C50C-407E-A947-70E740481C1C}">
                 <a14:useLocalDpi xmlns:a14="http://schemas.microsoft.com/office/drawing/2010/main" val="0"/>
@@ -9491,6 +9797,311 @@
               <a:t>Watershed</a:t>
             </a:r>
             <a:endParaRPr lang="fr-FR" sz="3600" dirty="0"/>
+          </a:p>
+        </p:txBody>
+      </p:sp>
+      <p:pic>
+        <p:nvPicPr>
+          <p:cNvPr id="128" name="Image 127"/>
+          <p:cNvPicPr>
+            <a:picLocks noChangeAspect="1"/>
+          </p:cNvPicPr>
+          <p:nvPr/>
+        </p:nvPicPr>
+        <p:blipFill>
+          <a:blip r:embed="rId37" cstate="print">
+            <a:extLst>
+              <a:ext uri="{28A0092B-C50C-407E-A947-70E740481C1C}">
+                <a14:useLocalDpi xmlns:a14="http://schemas.microsoft.com/office/drawing/2010/main" val="0"/>
+              </a:ext>
+            </a:extLst>
+          </a:blip>
+          <a:stretch>
+            <a:fillRect/>
+          </a:stretch>
+        </p:blipFill>
+        <p:spPr>
+          <a:xfrm>
+            <a:off x="6158816" y="26913863"/>
+            <a:ext cx="1088601" cy="1067035"/>
+          </a:xfrm>
+          <a:prstGeom prst="rect">
+            <a:avLst/>
+          </a:prstGeom>
+        </p:spPr>
+      </p:pic>
+      <p:pic>
+        <p:nvPicPr>
+          <p:cNvPr id="130" name="Image 129"/>
+          <p:cNvPicPr>
+            <a:picLocks noChangeAspect="1"/>
+          </p:cNvPicPr>
+          <p:nvPr/>
+        </p:nvPicPr>
+        <p:blipFill>
+          <a:blip r:embed="rId36" cstate="print">
+            <a:extLst>
+              <a:ext uri="{28A0092B-C50C-407E-A947-70E740481C1C}">
+                <a14:useLocalDpi xmlns:a14="http://schemas.microsoft.com/office/drawing/2010/main" val="0"/>
+              </a:ext>
+            </a:extLst>
+          </a:blip>
+          <a:stretch>
+            <a:fillRect/>
+          </a:stretch>
+        </p:blipFill>
+        <p:spPr>
+          <a:xfrm>
+            <a:off x="7175401" y="27143075"/>
+            <a:ext cx="545648" cy="547251"/>
+          </a:xfrm>
+          <a:prstGeom prst="rect">
+            <a:avLst/>
+          </a:prstGeom>
+        </p:spPr>
+      </p:pic>
+      <p:sp>
+        <p:nvSpPr>
+          <p:cNvPr id="11" name="Flèche droite 10"/>
+          <p:cNvSpPr/>
+          <p:nvPr/>
+        </p:nvSpPr>
+        <p:spPr>
+          <a:xfrm>
+            <a:off x="8166928" y="26643603"/>
+            <a:ext cx="529541" cy="455354"/>
+          </a:xfrm>
+          <a:prstGeom prst="rightArrow">
+            <a:avLst/>
+          </a:prstGeom>
+        </p:spPr>
+        <p:style>
+          <a:lnRef idx="2">
+            <a:schemeClr val="accent1">
+              <a:shade val="50000"/>
+            </a:schemeClr>
+          </a:lnRef>
+          <a:fillRef idx="1">
+            <a:schemeClr val="accent1"/>
+          </a:fillRef>
+          <a:effectRef idx="0">
+            <a:schemeClr val="accent1"/>
+          </a:effectRef>
+          <a:fontRef idx="minor">
+            <a:schemeClr val="lt1"/>
+          </a:fontRef>
+        </p:style>
+        <p:txBody>
+          <a:bodyPr rtlCol="0" anchor="ctr"/>
+          <a:lstStyle/>
+          <a:p>
+            <a:pPr algn="ctr"/>
+            <a:endParaRPr lang="fr-FR"/>
+          </a:p>
+        </p:txBody>
+      </p:sp>
+      <p:sp>
+        <p:nvSpPr>
+          <p:cNvPr id="144" name="Flèche droite 143"/>
+          <p:cNvSpPr/>
+          <p:nvPr/>
+        </p:nvSpPr>
+        <p:spPr>
+          <a:xfrm>
+            <a:off x="9546111" y="26643603"/>
+            <a:ext cx="529541" cy="455354"/>
+          </a:xfrm>
+          <a:prstGeom prst="rightArrow">
+            <a:avLst/>
+          </a:prstGeom>
+        </p:spPr>
+        <p:style>
+          <a:lnRef idx="2">
+            <a:schemeClr val="accent1">
+              <a:shade val="50000"/>
+            </a:schemeClr>
+          </a:lnRef>
+          <a:fillRef idx="1">
+            <a:schemeClr val="accent1"/>
+          </a:fillRef>
+          <a:effectRef idx="0">
+            <a:schemeClr val="accent1"/>
+          </a:effectRef>
+          <a:fontRef idx="minor">
+            <a:schemeClr val="lt1"/>
+          </a:fontRef>
+        </p:style>
+        <p:txBody>
+          <a:bodyPr rtlCol="0" anchor="ctr"/>
+          <a:lstStyle/>
+          <a:p>
+            <a:pPr algn="ctr"/>
+            <a:endParaRPr lang="fr-FR"/>
+          </a:p>
+        </p:txBody>
+      </p:sp>
+      <p:pic>
+        <p:nvPicPr>
+          <p:cNvPr id="13" name="Image 12"/>
+          <p:cNvPicPr>
+            <a:picLocks noChangeAspect="1"/>
+          </p:cNvPicPr>
+          <p:nvPr/>
+        </p:nvPicPr>
+        <p:blipFill>
+          <a:blip r:embed="rId38">
+            <a:extLst>
+              <a:ext uri="{28A0092B-C50C-407E-A947-70E740481C1C}">
+                <a14:useLocalDpi xmlns:a14="http://schemas.microsoft.com/office/drawing/2010/main" val="0"/>
+              </a:ext>
+            </a:extLst>
+          </a:blip>
+          <a:stretch>
+            <a:fillRect/>
+          </a:stretch>
+        </p:blipFill>
+        <p:spPr>
+          <a:xfrm>
+            <a:off x="1278529" y="28714630"/>
+            <a:ext cx="589959" cy="539260"/>
+          </a:xfrm>
+          <a:prstGeom prst="rect">
+            <a:avLst/>
+          </a:prstGeom>
+        </p:spPr>
+      </p:pic>
+      <p:sp>
+        <p:nvSpPr>
+          <p:cNvPr id="145" name="Flèche droite 144"/>
+          <p:cNvSpPr/>
+          <p:nvPr/>
+        </p:nvSpPr>
+        <p:spPr>
+          <a:xfrm>
+            <a:off x="14344969" y="32041827"/>
+            <a:ext cx="1137314" cy="899597"/>
+          </a:xfrm>
+          <a:prstGeom prst="rightArrow">
+            <a:avLst/>
+          </a:prstGeom>
+          <a:ln>
+            <a:solidFill>
+              <a:schemeClr val="tx1"/>
+            </a:solidFill>
+          </a:ln>
+        </p:spPr>
+        <p:style>
+          <a:lnRef idx="2">
+            <a:schemeClr val="accent1">
+              <a:shade val="50000"/>
+            </a:schemeClr>
+          </a:lnRef>
+          <a:fillRef idx="1">
+            <a:schemeClr val="accent1"/>
+          </a:fillRef>
+          <a:effectRef idx="0">
+            <a:schemeClr val="accent1"/>
+          </a:effectRef>
+          <a:fontRef idx="minor">
+            <a:schemeClr val="lt1"/>
+          </a:fontRef>
+        </p:style>
+        <p:txBody>
+          <a:bodyPr rtlCol="0" anchor="ctr"/>
+          <a:lstStyle/>
+          <a:p>
+            <a:pPr algn="ctr"/>
+            <a:endParaRPr lang="fr-FR"/>
+          </a:p>
+        </p:txBody>
+      </p:sp>
+      <p:sp>
+        <p:nvSpPr>
+          <p:cNvPr id="146" name="Flèche droite 145"/>
+          <p:cNvSpPr/>
+          <p:nvPr/>
+        </p:nvSpPr>
+        <p:spPr>
+          <a:xfrm rot="5400000">
+            <a:off x="12003985" y="25827892"/>
+            <a:ext cx="1382232" cy="899597"/>
+          </a:xfrm>
+          <a:prstGeom prst="rightArrow">
+            <a:avLst/>
+          </a:prstGeom>
+          <a:ln>
+            <a:solidFill>
+              <a:schemeClr val="tx1"/>
+            </a:solidFill>
+          </a:ln>
+        </p:spPr>
+        <p:style>
+          <a:lnRef idx="2">
+            <a:schemeClr val="accent1">
+              <a:shade val="50000"/>
+            </a:schemeClr>
+          </a:lnRef>
+          <a:fillRef idx="1">
+            <a:schemeClr val="accent1"/>
+          </a:fillRef>
+          <a:effectRef idx="0">
+            <a:schemeClr val="accent1"/>
+          </a:effectRef>
+          <a:fontRef idx="minor">
+            <a:schemeClr val="lt1"/>
+          </a:fontRef>
+        </p:style>
+        <p:txBody>
+          <a:bodyPr rtlCol="0" anchor="ctr"/>
+          <a:lstStyle/>
+          <a:p>
+            <a:pPr algn="ctr"/>
+            <a:endParaRPr lang="fr-FR"/>
+          </a:p>
+        </p:txBody>
+      </p:sp>
+      <p:sp>
+        <p:nvSpPr>
+          <p:cNvPr id="147" name="Flèche droite 146"/>
+          <p:cNvSpPr/>
+          <p:nvPr/>
+        </p:nvSpPr>
+        <p:spPr>
+          <a:xfrm>
+            <a:off x="20154479" y="27135560"/>
+            <a:ext cx="893569" cy="899597"/>
+          </a:xfrm>
+          <a:prstGeom prst="rightArrow">
+            <a:avLst/>
+          </a:prstGeom>
+          <a:ln>
+            <a:solidFill>
+              <a:schemeClr val="tx1"/>
+            </a:solidFill>
+          </a:ln>
+        </p:spPr>
+        <p:style>
+          <a:lnRef idx="2">
+            <a:schemeClr val="accent1">
+              <a:shade val="50000"/>
+            </a:schemeClr>
+          </a:lnRef>
+          <a:fillRef idx="1">
+            <a:schemeClr val="accent1"/>
+          </a:fillRef>
+          <a:effectRef idx="0">
+            <a:schemeClr val="accent1"/>
+          </a:effectRef>
+          <a:fontRef idx="minor">
+            <a:schemeClr val="lt1"/>
+          </a:fontRef>
+        </p:style>
+        <p:txBody>
+          <a:bodyPr rtlCol="0" anchor="ctr"/>
+          <a:lstStyle/>
+          <a:p>
+            <a:pPr algn="ctr"/>
+            <a:endParaRPr lang="fr-FR"/>
           </a:p>
         </p:txBody>
       </p:sp>

</xml_diff>

<commit_message>
poster and slides updated
</commit_message>
<xml_diff>
--- a/docs/Poster_Ecotoxicomic_sbasak.pptx
+++ b/docs/Poster_Ecotoxicomic_sbasak.pptx
@@ -197,7 +197,7 @@
           <a:p>
             <a:fld id="{30B2879C-E2E7-41DD-8C48-B2C9A03F15D4}" type="datetimeFigureOut">
               <a:rPr lang="fr-FR" smtClean="0"/>
-              <a:t>04/10/2024</a:t>
+              <a:t>08/10/2024</a:t>
             </a:fld>
             <a:endParaRPr lang="fr-FR"/>
           </a:p>
@@ -596,7 +596,7 @@
           <a:p>
             <a:fld id="{36858CB8-11F8-4AAC-AB86-67A36E1B5295}" type="datetimeFigureOut">
               <a:rPr lang="fr-FR" smtClean="0"/>
-              <a:t>04/10/2024</a:t>
+              <a:t>08/10/2024</a:t>
             </a:fld>
             <a:endParaRPr lang="fr-FR" dirty="0"/>
           </a:p>
@@ -766,7 +766,7 @@
           <a:p>
             <a:fld id="{36858CB8-11F8-4AAC-AB86-67A36E1B5295}" type="datetimeFigureOut">
               <a:rPr lang="fr-FR" smtClean="0"/>
-              <a:t>04/10/2024</a:t>
+              <a:t>08/10/2024</a:t>
             </a:fld>
             <a:endParaRPr lang="fr-FR" dirty="0"/>
           </a:p>
@@ -946,7 +946,7 @@
           <a:p>
             <a:fld id="{36858CB8-11F8-4AAC-AB86-67A36E1B5295}" type="datetimeFigureOut">
               <a:rPr lang="fr-FR" smtClean="0"/>
-              <a:t>04/10/2024</a:t>
+              <a:t>08/10/2024</a:t>
             </a:fld>
             <a:endParaRPr lang="fr-FR" dirty="0"/>
           </a:p>
@@ -1116,7 +1116,7 @@
           <a:p>
             <a:fld id="{36858CB8-11F8-4AAC-AB86-67A36E1B5295}" type="datetimeFigureOut">
               <a:rPr lang="fr-FR" smtClean="0"/>
-              <a:t>04/10/2024</a:t>
+              <a:t>08/10/2024</a:t>
             </a:fld>
             <a:endParaRPr lang="fr-FR" dirty="0"/>
           </a:p>
@@ -1360,7 +1360,7 @@
           <a:p>
             <a:fld id="{36858CB8-11F8-4AAC-AB86-67A36E1B5295}" type="datetimeFigureOut">
               <a:rPr lang="fr-FR" smtClean="0"/>
-              <a:t>04/10/2024</a:t>
+              <a:t>08/10/2024</a:t>
             </a:fld>
             <a:endParaRPr lang="fr-FR" dirty="0"/>
           </a:p>
@@ -1592,7 +1592,7 @@
           <a:p>
             <a:fld id="{36858CB8-11F8-4AAC-AB86-67A36E1B5295}" type="datetimeFigureOut">
               <a:rPr lang="fr-FR" smtClean="0"/>
-              <a:t>04/10/2024</a:t>
+              <a:t>08/10/2024</a:t>
             </a:fld>
             <a:endParaRPr lang="fr-FR" dirty="0"/>
           </a:p>
@@ -1959,7 +1959,7 @@
           <a:p>
             <a:fld id="{36858CB8-11F8-4AAC-AB86-67A36E1B5295}" type="datetimeFigureOut">
               <a:rPr lang="fr-FR" smtClean="0"/>
-              <a:t>04/10/2024</a:t>
+              <a:t>08/10/2024</a:t>
             </a:fld>
             <a:endParaRPr lang="fr-FR" dirty="0"/>
           </a:p>
@@ -2077,7 +2077,7 @@
           <a:p>
             <a:fld id="{36858CB8-11F8-4AAC-AB86-67A36E1B5295}" type="datetimeFigureOut">
               <a:rPr lang="fr-FR" smtClean="0"/>
-              <a:t>04/10/2024</a:t>
+              <a:t>08/10/2024</a:t>
             </a:fld>
             <a:endParaRPr lang="fr-FR" dirty="0"/>
           </a:p>
@@ -2172,7 +2172,7 @@
           <a:p>
             <a:fld id="{36858CB8-11F8-4AAC-AB86-67A36E1B5295}" type="datetimeFigureOut">
               <a:rPr lang="fr-FR" smtClean="0"/>
-              <a:t>04/10/2024</a:t>
+              <a:t>08/10/2024</a:t>
             </a:fld>
             <a:endParaRPr lang="fr-FR" dirty="0"/>
           </a:p>
@@ -2449,7 +2449,7 @@
           <a:p>
             <a:fld id="{36858CB8-11F8-4AAC-AB86-67A36E1B5295}" type="datetimeFigureOut">
               <a:rPr lang="fr-FR" smtClean="0"/>
-              <a:t>04/10/2024</a:t>
+              <a:t>08/10/2024</a:t>
             </a:fld>
             <a:endParaRPr lang="fr-FR" dirty="0"/>
           </a:p>
@@ -2706,7 +2706,7 @@
           <a:p>
             <a:fld id="{36858CB8-11F8-4AAC-AB86-67A36E1B5295}" type="datetimeFigureOut">
               <a:rPr lang="fr-FR" smtClean="0"/>
-              <a:t>04/10/2024</a:t>
+              <a:t>08/10/2024</a:t>
             </a:fld>
             <a:endParaRPr lang="fr-FR" dirty="0"/>
           </a:p>
@@ -2919,7 +2919,7 @@
           <a:p>
             <a:fld id="{36858CB8-11F8-4AAC-AB86-67A36E1B5295}" type="datetimeFigureOut">
               <a:rPr lang="fr-FR" smtClean="0"/>
-              <a:t>04/10/2024</a:t>
+              <a:t>08/10/2024</a:t>
             </a:fld>
             <a:endParaRPr lang="fr-FR" dirty="0"/>
           </a:p>
@@ -4032,31 +4032,7 @@
                   <a:schemeClr val="tx1"/>
                 </a:solidFill>
               </a:rPr>
-              <a:t>Relative </a:t>
-            </a:r>
-            <a:r>
-              <a:rPr lang="fr-FR" sz="3600" b="1" dirty="0" smtClean="0">
-                <a:solidFill>
-                  <a:schemeClr val="tx1"/>
-                </a:solidFill>
-              </a:rPr>
-              <a:t>impact of </a:t>
-            </a:r>
-            <a:r>
-              <a:rPr lang="fr-FR" sz="3600" b="1" dirty="0" smtClean="0">
-                <a:solidFill>
-                  <a:schemeClr val="tx1"/>
-                </a:solidFill>
-              </a:rPr>
-              <a:t>different </a:t>
-            </a:r>
-            <a:r>
-              <a:rPr lang="fr-FR" sz="3600" b="1" dirty="0" smtClean="0">
-                <a:solidFill>
-                  <a:schemeClr val="tx1"/>
-                </a:solidFill>
-              </a:rPr>
-              <a:t>environmental pathways </a:t>
+              <a:t>Relative impact of different environmental pathways </a:t>
             </a:r>
             <a:endParaRPr lang="fr-FR" sz="3600" b="1" dirty="0">
               <a:solidFill>
@@ -4402,15 +4378,7 @@
                   <a:schemeClr val="tx1"/>
                 </a:solidFill>
               </a:rPr>
-              <a:t>QRA module </a:t>
-            </a:r>
-            <a:r>
-              <a:rPr lang="fr-FR" sz="3600" b="1" dirty="0" smtClean="0">
-                <a:solidFill>
-                  <a:schemeClr val="tx1"/>
-                </a:solidFill>
-              </a:rPr>
-              <a:t>perspectives</a:t>
+              <a:t>QRA module perspectives</a:t>
             </a:r>
             <a:endParaRPr lang="fr-FR" sz="3600" b="1" dirty="0">
               <a:solidFill>
@@ -4564,11 +4532,6 @@
               </a:rPr>
               <a:t>experimental data </a:t>
             </a:r>
-            <a:endParaRPr lang="fr-FR" sz="3600" dirty="0" smtClean="0">
-              <a:solidFill>
-                <a:schemeClr val="tx1"/>
-              </a:solidFill>
-            </a:endParaRPr>
           </a:p>
           <a:p>
             <a:pPr algn="ctr"/>
@@ -6602,7 +6565,7 @@
             </p:nvSpPr>
             <p:spPr>
               <a:xfrm>
-                <a:off x="16291838" y="17792012"/>
+                <a:off x="16146857" y="17775831"/>
                 <a:ext cx="3230631" cy="646331"/>
               </a:xfrm>
               <a:prstGeom prst="rect">
@@ -6650,7 +6613,15 @@
                 <a:pPr algn="ctr"/>
                 <a:r>
                   <a:rPr lang="fr-FR" sz="3600" b="1" dirty="0" smtClean="0"/>
-                  <a:t>Drinking Water Treatement Plant</a:t>
+                  <a:t>Drinking Water </a:t>
+                </a:r>
+                <a:r>
+                  <a:rPr lang="fr-FR" sz="3600" b="1" dirty="0" smtClean="0"/>
+                  <a:t>Treatment </a:t>
+                </a:r>
+                <a:r>
+                  <a:rPr lang="fr-FR" sz="3600" b="1" dirty="0" smtClean="0"/>
+                  <a:t>Plant</a:t>
                 </a:r>
                 <a:endParaRPr lang="fr-FR" sz="3600" dirty="0"/>
               </a:p>
@@ -7646,7 +7617,7 @@
                 </p:nvSpPr>
                 <p:spPr>
                   <a:xfrm rot="5400000">
-                    <a:off x="6205047" y="18818562"/>
+                    <a:off x="6206068" y="18885714"/>
                     <a:ext cx="1138142" cy="625364"/>
                   </a:xfrm>
                   <a:prstGeom prst="curvedDownArrow">
@@ -7737,7 +7708,7 @@
             <p:spPr>
               <a:xfrm>
                 <a:off x="1079800" y="22761177"/>
-                <a:ext cx="12268558" cy="4042306"/>
+                <a:ext cx="12348074" cy="4042306"/>
               </a:xfrm>
               <a:prstGeom prst="roundRect">
                 <a:avLst>
@@ -7847,7 +7818,23 @@
                       <a:schemeClr val="tx1"/>
                     </a:solidFill>
                   </a:rPr>
-                  <a:t>      Ranifall carries ESBL </a:t>
+                  <a:t>      </a:t>
+                </a:r>
+                <a:r>
+                  <a:rPr lang="fr-FR" sz="3600" dirty="0" smtClean="0">
+                    <a:solidFill>
+                      <a:schemeClr val="tx1"/>
+                    </a:solidFill>
+                  </a:rPr>
+                  <a:t>Surface runoff </a:t>
+                </a:r>
+                <a:r>
+                  <a:rPr lang="fr-FR" sz="3600" dirty="0" smtClean="0">
+                    <a:solidFill>
+                      <a:schemeClr val="tx1"/>
+                    </a:solidFill>
+                  </a:rPr>
+                  <a:t>carries ESBL </a:t>
                 </a:r>
                 <a:r>
                   <a:rPr lang="fr-FR" sz="3600" i="1" dirty="0" smtClean="0">
@@ -7868,12 +7855,44 @@
               </a:p>
               <a:p>
                 <a:r>
+                  <a:rPr lang="fr-FR" sz="3600" dirty="0">
+                    <a:solidFill>
+                      <a:schemeClr val="tx1"/>
+                    </a:solidFill>
+                  </a:rPr>
+                  <a:t>Watershed </a:t>
+                </a:r>
+                <a:r>
                   <a:rPr lang="fr-FR" sz="3600" dirty="0" smtClean="0">
                     <a:solidFill>
                       <a:schemeClr val="tx1"/>
                     </a:solidFill>
                   </a:rPr>
-                  <a:t>Contamination of watershed </a:t>
+                  <a:t>is contaminated </a:t>
+                </a:r>
+                <a:r>
+                  <a:rPr lang="fr-FR" sz="3600" dirty="0" smtClean="0">
+                    <a:solidFill>
+                      <a:schemeClr val="tx1"/>
+                    </a:solidFill>
+                  </a:rPr>
+                  <a:t>from manure </a:t>
+                </a:r>
+                <a:r>
+                  <a:rPr lang="fr-FR" sz="3600" b="1" dirty="0" smtClean="0">
+                    <a:solidFill>
+                      <a:schemeClr val="tx1"/>
+                    </a:solidFill>
+                  </a:rPr>
+                  <a:t>c.f.</a:t>
+                </a:r>
+                <a:r>
+                  <a:rPr lang="fr-FR" sz="3600" dirty="0" smtClean="0">
+                    <a:solidFill>
+                      <a:schemeClr val="tx1"/>
+                    </a:solidFill>
+                  </a:rPr>
+                  <a:t> </a:t>
                 </a:r>
                 <a:r>
                   <a:rPr lang="fr-FR" sz="3600" dirty="0" smtClean="0">
@@ -7883,16 +7902,23 @@
                       </a:schemeClr>
                     </a:solidFill>
                   </a:rPr>
-                  <a:t>Sowah et al. (2020) </a:t>
+                  <a:t>Sowah </a:t>
                 </a:r>
                 <a:r>
-                  <a:rPr lang="fr-FR" sz="3600" dirty="0" smtClean="0">
+                  <a:rPr lang="fr-FR" sz="3600" dirty="0">
                     <a:solidFill>
-                      <a:schemeClr val="tx1"/>
+                      <a:schemeClr val="accent1">
+                        <a:lumMod val="75000"/>
+                      </a:schemeClr>
                     </a:solidFill>
                   </a:rPr>
-                  <a:t>from manure</a:t>
+                  <a:t>et al. (2020)</a:t>
                 </a:r>
+                <a:endParaRPr lang="fr-FR" sz="3600" dirty="0" smtClean="0">
+                  <a:solidFill>
+                    <a:schemeClr val="tx1"/>
+                  </a:solidFill>
+                </a:endParaRPr>
               </a:p>
               <a:p>
                 <a:r>
@@ -8846,7 +8872,7 @@
         </p:blipFill>
         <p:spPr>
           <a:xfrm>
-            <a:off x="11508501" y="23319239"/>
+            <a:off x="12781273" y="23318946"/>
             <a:ext cx="501977" cy="503154"/>
           </a:xfrm>
           <a:prstGeom prst="rect">
@@ -8995,45 +9021,101 @@
           <a:lstStyle/>
           <a:p>
             <a:r>
+              <a:rPr lang="fr-FR" sz="3600" b="1" dirty="0" smtClean="0">
+                <a:solidFill>
+                  <a:schemeClr val="tx1"/>
+                </a:solidFill>
+              </a:rPr>
+              <a:t>Dynamics of </a:t>
+            </a:r>
+            <a:r>
+              <a:rPr lang="fr-FR" sz="3600" b="1" dirty="0" smtClean="0">
+                <a:solidFill>
+                  <a:schemeClr val="tx1"/>
+                </a:solidFill>
+              </a:rPr>
+              <a:t>ESBL </a:t>
+            </a:r>
+            <a:r>
+              <a:rPr lang="fr-FR" sz="3600" b="1" i="1" dirty="0" smtClean="0">
+                <a:solidFill>
+                  <a:schemeClr val="tx1"/>
+                </a:solidFill>
+              </a:rPr>
+              <a:t>E. </a:t>
+            </a:r>
+            <a:r>
+              <a:rPr lang="fr-FR" sz="3600" b="1" i="1" dirty="0" smtClean="0">
+                <a:solidFill>
+                  <a:schemeClr val="tx1"/>
+                </a:solidFill>
+              </a:rPr>
+              <a:t>coli</a:t>
+            </a:r>
+            <a:r>
+              <a:rPr lang="fr-FR" sz="3600" b="1" dirty="0" smtClean="0">
+                <a:solidFill>
+                  <a:schemeClr val="tx1"/>
+                </a:solidFill>
+              </a:rPr>
+              <a:t> in </a:t>
+            </a:r>
+            <a:r>
+              <a:rPr lang="fr-FR" sz="3600" b="1" dirty="0">
+                <a:solidFill>
+                  <a:schemeClr val="tx1"/>
+                </a:solidFill>
+              </a:rPr>
+              <a:t>c</a:t>
+            </a:r>
+            <a:r>
+              <a:rPr lang="fr-FR" sz="3600" b="1" dirty="0" smtClean="0">
+                <a:solidFill>
+                  <a:schemeClr val="tx1"/>
+                </a:solidFill>
+              </a:rPr>
+              <a:t>ontaminated </a:t>
+            </a:r>
+            <a:r>
+              <a:rPr lang="fr-FR" sz="3600" b="1" dirty="0" smtClean="0">
+                <a:solidFill>
+                  <a:schemeClr val="tx1"/>
+                </a:solidFill>
+              </a:rPr>
+              <a:t>watershed </a:t>
+            </a:r>
+            <a:r>
+              <a:rPr lang="fr-FR" sz="3600" dirty="0">
+                <a:solidFill>
+                  <a:schemeClr val="accent1">
+                    <a:lumMod val="75000"/>
+                  </a:schemeClr>
+                </a:solidFill>
+              </a:rPr>
+              <a:t>Mancini (1978</a:t>
+            </a:r>
+            <a:r>
               <a:rPr lang="fr-FR" sz="3600" dirty="0" smtClean="0">
                 <a:solidFill>
-                  <a:srgbClr val="FF0000"/>
-                </a:solidFill>
-              </a:rPr>
-              <a:t>Source of ESBL </a:t>
-            </a:r>
-            <a:r>
-              <a:rPr lang="fr-FR" sz="3600" i="1" dirty="0" smtClean="0">
-                <a:solidFill>
-                  <a:srgbClr val="FF0000"/>
-                </a:solidFill>
-              </a:rPr>
-              <a:t>E. coli</a:t>
-            </a:r>
-            <a:r>
-              <a:rPr lang="fr-FR" sz="3600" b="1" dirty="0" smtClean="0">
-                <a:solidFill>
-                  <a:schemeClr val="tx1"/>
-                </a:solidFill>
-              </a:rPr>
-              <a:t>: </a:t>
-            </a:r>
-            <a:r>
-              <a:rPr lang="fr-FR" sz="3600" dirty="0">
-                <a:solidFill>
-                  <a:schemeClr val="tx1"/>
-                </a:solidFill>
-              </a:rPr>
-              <a:t>Contaminated </a:t>
-            </a:r>
-            <a:r>
-              <a:rPr lang="fr-FR" sz="3600" dirty="0" smtClean="0">
-                <a:solidFill>
-                  <a:schemeClr val="tx1"/>
-                </a:solidFill>
-              </a:rPr>
-              <a:t>watershed adjacant to agricultural land</a:t>
-            </a:r>
+                  <a:schemeClr val="accent1">
+                    <a:lumMod val="75000"/>
+                  </a:schemeClr>
+                </a:solidFill>
+              </a:rPr>
+              <a:t>)</a:t>
+            </a:r>
+            <a:endParaRPr lang="fr-FR" sz="3600" b="1" dirty="0" smtClean="0">
+              <a:solidFill>
+                <a:schemeClr val="tx1"/>
+              </a:solidFill>
+            </a:endParaRPr>
+          </a:p>
+          <a:p>
+            <a:endParaRPr lang="fr-FR" sz="3600" b="1" dirty="0">
+              <a:solidFill>
+                <a:schemeClr val="tx1"/>
+              </a:solidFill>
+            </a:endParaRPr>
           </a:p>
           <a:p>
             <a:pPr marL="571500" indent="-571500">
@@ -9046,7 +9128,15 @@
                   <a:schemeClr val="tx1"/>
                 </a:solidFill>
               </a:rPr>
-              <a:t>Decay in ESBL </a:t>
+              <a:t>Decay </a:t>
+            </a:r>
+            <a:r>
+              <a:rPr lang="fr-FR" sz="3600" dirty="0" smtClean="0">
+                <a:solidFill>
+                  <a:schemeClr val="tx1"/>
+                </a:solidFill>
+              </a:rPr>
+              <a:t>in ESBL </a:t>
             </a:r>
             <a:r>
               <a:rPr lang="fr-FR" sz="3600" i="1" dirty="0" smtClean="0">
@@ -9064,40 +9154,28 @@
               </a:rPr>
               <a:t>population due to environmental factors </a:t>
             </a:r>
+            <a:endParaRPr lang="fr-FR" sz="3600" dirty="0">
+              <a:solidFill>
+                <a:schemeClr val="tx1"/>
+              </a:solidFill>
+            </a:endParaRPr>
+          </a:p>
+          <a:p>
             <a:r>
               <a:rPr lang="fr-FR" sz="3600" dirty="0" smtClean="0">
                 <a:solidFill>
-                  <a:schemeClr val="accent1">
-                    <a:lumMod val="75000"/>
-                  </a:schemeClr>
-                </a:solidFill>
-              </a:rPr>
-              <a:t>Mancini (1978)</a:t>
-            </a:r>
-          </a:p>
-          <a:p>
+                  <a:schemeClr val="tx1"/>
+                </a:solidFill>
+              </a:rPr>
+              <a:t>Decay </a:t>
+            </a:r>
             <a:r>
               <a:rPr lang="fr-FR" sz="3600" dirty="0" smtClean="0">
                 <a:solidFill>
                   <a:schemeClr val="tx1"/>
                 </a:solidFill>
               </a:rPr>
-              <a:t/>
-            </a:r>
-            <a:br>
-              <a:rPr lang="fr-FR" sz="3600" dirty="0" smtClean="0">
-                <a:solidFill>
-                  <a:schemeClr val="tx1"/>
-                </a:solidFill>
-              </a:rPr>
-            </a:br>
-            <a:r>
-              <a:rPr lang="fr-FR" sz="3600" dirty="0" smtClean="0">
-                <a:solidFill>
-                  <a:schemeClr val="tx1"/>
-                </a:solidFill>
-              </a:rPr>
-              <a:t>Decay rate </a:t>
+              <a:t>rate </a:t>
             </a:r>
             <a:r>
               <a:rPr lang="fr-FR" sz="3600" dirty="0" smtClean="0">
@@ -9257,7 +9335,15 @@
                   <a:schemeClr val="tx1"/>
                 </a:solidFill>
               </a:rPr>
-              <a:t>concentration is based on time elasped before water treatement</a:t>
+              <a:t>concentration is based on time elasped before water </a:t>
+            </a:r>
+            <a:r>
+              <a:rPr lang="fr-FR" sz="3600" dirty="0" smtClean="0">
+                <a:solidFill>
+                  <a:schemeClr val="tx1"/>
+                </a:solidFill>
+              </a:rPr>
+              <a:t>usage</a:t>
             </a:r>
             <a:endParaRPr lang="fr-FR" sz="3600" dirty="0">
               <a:solidFill>
@@ -9365,7 +9451,7 @@
         </p:blipFill>
         <p:spPr>
           <a:xfrm>
-            <a:off x="21168933" y="23333531"/>
+            <a:off x="21412531" y="22740384"/>
             <a:ext cx="659706" cy="661645"/>
           </a:xfrm>
           <a:prstGeom prst="rect">
@@ -9395,7 +9481,7 @@
         </p:blipFill>
         <p:spPr>
           <a:xfrm>
-            <a:off x="20520987" y="23340385"/>
+            <a:off x="20804090" y="22781865"/>
             <a:ext cx="566207" cy="567315"/>
           </a:xfrm>
           <a:prstGeom prst="rect">
@@ -9441,8 +9527,8 @@
         </p:nvSpPr>
         <p:spPr>
           <a:xfrm>
-            <a:off x="1102294" y="26328685"/>
-            <a:ext cx="12247628" cy="3204673"/>
+            <a:off x="1102293" y="26328685"/>
+            <a:ext cx="12327145" cy="3204673"/>
           </a:xfrm>
           <a:prstGeom prst="roundRect">
             <a:avLst>
@@ -9584,7 +9670,23 @@
                   <a:schemeClr val="tx1"/>
                 </a:solidFill>
               </a:rPr>
-              <a:t>Decay in soil </a:t>
+              <a:t>Bacteria d</a:t>
+            </a:r>
+            <a:r>
+              <a:rPr lang="fr-FR" sz="3600" dirty="0" smtClean="0">
+                <a:solidFill>
+                  <a:schemeClr val="tx1"/>
+                </a:solidFill>
+              </a:rPr>
+              <a:t>ecay </a:t>
+            </a:r>
+            <a:r>
+              <a:rPr lang="fr-FR" sz="3600" dirty="0" smtClean="0">
+                <a:solidFill>
+                  <a:schemeClr val="tx1"/>
+                </a:solidFill>
+              </a:rPr>
+              <a:t>in soil </a:t>
             </a:r>
             <a:r>
               <a:rPr lang="fr-FR" sz="3600" dirty="0" smtClean="0">
@@ -9612,53 +9714,53 @@
                   </a:schemeClr>
                 </a:solidFill>
               </a:rPr>
-              <a:t>Phang et al. (2020)</a:t>
+              <a:t>Phang et al. (2020</a:t>
             </a:r>
             <a:r>
               <a:rPr lang="fr-FR" sz="3600" dirty="0" smtClean="0">
-                <a:solidFill>
-                  <a:schemeClr val="tx1"/>
-                </a:solidFill>
-              </a:rPr>
-              <a:t>, …</a:t>
-            </a:r>
-          </a:p>
-          <a:p>
-            <a:r>
-              <a:rPr lang="fr-FR" sz="3600" dirty="0">
-                <a:solidFill>
-                  <a:schemeClr val="tx1"/>
-                </a:solidFill>
-              </a:rPr>
-              <a:t>Bacteria transport from soil to watershed </a:t>
-            </a:r>
-            <a:r>
-              <a:rPr lang="fr-FR" sz="3600" dirty="0">
                 <a:solidFill>
                   <a:schemeClr val="accent1">
                     <a:lumMod val="75000"/>
                   </a:schemeClr>
                 </a:solidFill>
               </a:rPr>
-              <a:t>Neitsch et al</a:t>
-            </a:r>
-            <a:r>
-              <a:rPr lang="fr-FR" sz="3600" dirty="0" smtClean="0">
+              <a:t>)</a:t>
+            </a:r>
+            <a:endParaRPr lang="fr-FR" sz="3600" dirty="0" smtClean="0">
+              <a:solidFill>
+                <a:schemeClr val="tx1"/>
+              </a:solidFill>
+            </a:endParaRPr>
+          </a:p>
+          <a:p>
+            <a:r>
+              <a:rPr lang="fr-FR" sz="3600" dirty="0">
+                <a:solidFill>
+                  <a:schemeClr val="tx1"/>
+                </a:solidFill>
+              </a:rPr>
+              <a:t>Bacteria transport from soil to watershed </a:t>
+            </a:r>
+            <a:r>
+              <a:rPr lang="fr-FR" sz="3600" dirty="0">
                 <a:solidFill>
                   <a:schemeClr val="accent1">
                     <a:lumMod val="75000"/>
                   </a:schemeClr>
                 </a:solidFill>
               </a:rPr>
+              <a:t>Neitsch et al</a:t>
+            </a:r>
+            <a:r>
+              <a:rPr lang="fr-FR" sz="3600" dirty="0" smtClean="0">
+                <a:solidFill>
+                  <a:schemeClr val="accent1">
+                    <a:lumMod val="75000"/>
+                  </a:schemeClr>
+                </a:solidFill>
+              </a:rPr>
               <a:t>. (2011)</a:t>
             </a:r>
-            <a:endParaRPr lang="fr-FR" sz="3600" dirty="0" smtClean="0">
-              <a:solidFill>
-                <a:schemeClr val="accent1">
-                  <a:lumMod val="75000"/>
-                </a:schemeClr>
-              </a:solidFill>
-            </a:endParaRPr>
           </a:p>
           <a:p>
             <a:r>
@@ -9761,7 +9863,7 @@
         </p:blipFill>
         <p:spPr>
           <a:xfrm>
-            <a:off x="6847533" y="23283879"/>
+            <a:off x="8131352" y="23300039"/>
             <a:ext cx="600692" cy="602457"/>
           </a:xfrm>
           <a:prstGeom prst="rect">

</xml_diff>